<commit_message>
Added Training artifacts - Day 18.
</commit_message>
<xml_diff>
--- a/Day 18/Slides/6. Augmenting Features and Tooling/augmenting-features-and-tooling-slides.pptx
+++ b/Day 18/Slides/6. Augmenting Features and Tooling/augmenting-features-and-tooling-slides.pptx
@@ -5,7 +5,7 @@
     <p:sldMasterId id="2147483648" r:id="rId1"/>
   </p:sldMasterIdLst>
   <p:notesMasterIdLst>
-    <p:notesMasterId r:id="rId18"/>
+    <p:notesMasterId r:id="rId20"/>
   </p:notesMasterIdLst>
   <p:sldIdLst>
     <p:sldId id="256" r:id="rId3"/>
@@ -20,9 +20,11 @@
     <p:sldId id="267" r:id="rId12"/>
     <p:sldId id="268" r:id="rId13"/>
     <p:sldId id="269" r:id="rId14"/>
-    <p:sldId id="270" r:id="rId15"/>
-    <p:sldId id="271" r:id="rId16"/>
-    <p:sldId id="272" r:id="rId17"/>
+    <p:sldId id="271" r:id="rId15"/>
+    <p:sldId id="275" r:id="rId16"/>
+    <p:sldId id="270" r:id="rId17"/>
+    <p:sldId id="276" r:id="rId18"/>
+    <p:sldId id="272" r:id="rId19"/>
   </p:sldIdLst>
   <p:sldSz cx="18288000" cy="10287000"/>
   <p:notesSz cx="18288000" cy="10287000"/>
@@ -3519,508 +3521,67 @@
       <p:sp>
         <p:nvSpPr>
           <p:cNvPr id="2" name="object 2"/>
-          <p:cNvSpPr txBox="1"/>
-          <p:nvPr/>
+          <p:cNvSpPr txBox="1">
+            <a:spLocks noGrp="1"/>
+          </p:cNvSpPr>
+          <p:nvPr>
+            <p:ph type="title"/>
+          </p:nvPr>
         </p:nvSpPr>
         <p:spPr>
           <a:xfrm>
-            <a:off x="992699" y="4281932"/>
-            <a:ext cx="5145405" cy="1674495"/>
+            <a:off x="3381692" y="4086859"/>
+            <a:ext cx="11524615" cy="2046605"/>
           </a:xfrm>
           <a:prstGeom prst="rect">
             <a:avLst/>
           </a:prstGeom>
         </p:spPr>
         <p:txBody>
-          <a:bodyPr vert="horz" wrap="square" lIns="0" tIns="9525" rIns="0" bIns="0" rtlCol="0">
+          <a:bodyPr vert="horz" wrap="square" lIns="0" tIns="3175" rIns="0" bIns="0" rtlCol="0">
             <a:spAutoFit/>
           </a:bodyPr>
           <a:lstStyle/>
           <a:p>
-            <a:pPr marL="1390650" marR="5080" indent="-1378585">
+            <a:pPr marL="2251075" marR="5080" indent="-2239010">
               <a:lnSpc>
-                <a:spcPct val="100000"/>
+                <a:spcPct val="101000"/>
               </a:lnSpc>
               <a:spcBef>
-                <a:spcPts val="75"/>
+                <a:spcPts val="25"/>
               </a:spcBef>
             </a:pPr>
             <a:r>
-              <a:rPr sz="5400" spc="265" dirty="0">
-                <a:solidFill>
-                  <a:srgbClr val="404040"/>
-                </a:solidFill>
-                <a:latin typeface="Tahoma" panose="020B0604030504040204"/>
-                <a:cs typeface="Tahoma" panose="020B0604030504040204"/>
-              </a:rPr>
-              <a:t>P</a:t>
-            </a:r>
-            <a:r>
-              <a:rPr sz="5400" spc="-75" dirty="0">
-                <a:solidFill>
-                  <a:srgbClr val="404040"/>
-                </a:solidFill>
-                <a:latin typeface="Tahoma" panose="020B0604030504040204"/>
-                <a:cs typeface="Tahoma" panose="020B0604030504040204"/>
-              </a:rPr>
-              <a:t>r</a:t>
-            </a:r>
-            <a:r>
-              <a:rPr sz="5400" spc="125" dirty="0">
-                <a:solidFill>
-                  <a:srgbClr val="404040"/>
-                </a:solidFill>
-                <a:latin typeface="Tahoma" panose="020B0604030504040204"/>
-                <a:cs typeface="Tahoma" panose="020B0604030504040204"/>
-              </a:rPr>
-              <a:t>o</a:t>
-            </a:r>
-            <a:r>
-              <a:rPr sz="5400" spc="160" dirty="0">
-                <a:solidFill>
-                  <a:srgbClr val="404040"/>
-                </a:solidFill>
-                <a:latin typeface="Tahoma" panose="020B0604030504040204"/>
-                <a:cs typeface="Tahoma" panose="020B0604030504040204"/>
-              </a:rPr>
-              <a:t>g</a:t>
-            </a:r>
-            <a:r>
-              <a:rPr sz="5400" spc="-75" dirty="0">
-                <a:solidFill>
-                  <a:srgbClr val="404040"/>
-                </a:solidFill>
-                <a:latin typeface="Tahoma" panose="020B0604030504040204"/>
-                <a:cs typeface="Tahoma" panose="020B0604030504040204"/>
-              </a:rPr>
-              <a:t>r</a:t>
-            </a:r>
-            <a:r>
-              <a:rPr sz="5400" spc="180" dirty="0">
-                <a:solidFill>
-                  <a:srgbClr val="404040"/>
-                </a:solidFill>
-                <a:latin typeface="Tahoma" panose="020B0604030504040204"/>
-                <a:cs typeface="Tahoma" panose="020B0604030504040204"/>
-              </a:rPr>
-              <a:t>e</a:t>
-            </a:r>
-            <a:r>
-              <a:rPr sz="5400" spc="10" dirty="0">
-                <a:solidFill>
-                  <a:srgbClr val="404040"/>
-                </a:solidFill>
-                <a:latin typeface="Tahoma" panose="020B0604030504040204"/>
-                <a:cs typeface="Tahoma" panose="020B0604030504040204"/>
-              </a:rPr>
-              <a:t>ss</a:t>
-            </a:r>
-            <a:r>
-              <a:rPr sz="5400" spc="-5" dirty="0">
-                <a:solidFill>
-                  <a:srgbClr val="404040"/>
-                </a:solidFill>
-                <a:latin typeface="Tahoma" panose="020B0604030504040204"/>
-                <a:cs typeface="Tahoma" panose="020B0604030504040204"/>
-              </a:rPr>
-              <a:t>i</a:t>
-            </a:r>
-            <a:r>
-              <a:rPr sz="5400" spc="-10" dirty="0">
-                <a:solidFill>
-                  <a:srgbClr val="404040"/>
-                </a:solidFill>
-                <a:latin typeface="Tahoma" panose="020B0604030504040204"/>
-                <a:cs typeface="Tahoma" panose="020B0604030504040204"/>
-              </a:rPr>
-              <a:t>v</a:t>
-            </a:r>
-            <a:r>
-              <a:rPr sz="5400" spc="180" dirty="0">
-                <a:solidFill>
-                  <a:srgbClr val="404040"/>
-                </a:solidFill>
-                <a:latin typeface="Tahoma" panose="020B0604030504040204"/>
-                <a:cs typeface="Tahoma" panose="020B0604030504040204"/>
-              </a:rPr>
-              <a:t>e</a:t>
-            </a:r>
-            <a:r>
-              <a:rPr sz="5400" spc="-375" dirty="0">
-                <a:solidFill>
-                  <a:srgbClr val="404040"/>
-                </a:solidFill>
-                <a:latin typeface="Tahoma" panose="020B0604030504040204"/>
-                <a:cs typeface="Tahoma" panose="020B0604030504040204"/>
-              </a:rPr>
-              <a:t> </a:t>
-            </a:r>
-            <a:r>
-              <a:rPr sz="5400" spc="-140" dirty="0">
-                <a:solidFill>
-                  <a:srgbClr val="404040"/>
-                </a:solidFill>
-                <a:latin typeface="Tahoma" panose="020B0604030504040204"/>
-                <a:cs typeface="Tahoma" panose="020B0604030504040204"/>
-              </a:rPr>
-              <a:t>W</a:t>
-            </a:r>
-            <a:r>
-              <a:rPr sz="5400" spc="180" dirty="0">
-                <a:solidFill>
-                  <a:srgbClr val="404040"/>
-                </a:solidFill>
-                <a:latin typeface="Tahoma" panose="020B0604030504040204"/>
-                <a:cs typeface="Tahoma" panose="020B0604030504040204"/>
-              </a:rPr>
-              <a:t>e</a:t>
-            </a:r>
-            <a:r>
-              <a:rPr sz="5400" spc="160" dirty="0">
-                <a:solidFill>
-                  <a:srgbClr val="404040"/>
-                </a:solidFill>
-                <a:latin typeface="Tahoma" panose="020B0604030504040204"/>
-                <a:cs typeface="Tahoma" panose="020B0604030504040204"/>
-              </a:rPr>
-              <a:t>b  </a:t>
-            </a:r>
-            <a:r>
-              <a:rPr sz="5400" spc="145" dirty="0">
-                <a:solidFill>
-                  <a:srgbClr val="404040"/>
-                </a:solidFill>
-                <a:latin typeface="Tahoma" panose="020B0604030504040204"/>
-                <a:cs typeface="Tahoma" panose="020B0604030504040204"/>
-              </a:rPr>
-              <a:t>A</a:t>
-            </a:r>
-            <a:r>
-              <a:rPr sz="5400" spc="140" dirty="0">
-                <a:solidFill>
-                  <a:srgbClr val="404040"/>
-                </a:solidFill>
-                <a:latin typeface="Tahoma" panose="020B0604030504040204"/>
-                <a:cs typeface="Tahoma" panose="020B0604030504040204"/>
-              </a:rPr>
-              <a:t>p</a:t>
-            </a:r>
-            <a:r>
-              <a:rPr sz="5400" spc="225" dirty="0">
-                <a:solidFill>
-                  <a:srgbClr val="404040"/>
-                </a:solidFill>
-                <a:latin typeface="Tahoma" panose="020B0604030504040204"/>
-                <a:cs typeface="Tahoma" panose="020B0604030504040204"/>
-              </a:rPr>
-              <a:t>p</a:t>
-            </a:r>
-            <a:r>
-              <a:rPr sz="5400" spc="65" dirty="0">
-                <a:solidFill>
-                  <a:srgbClr val="404040"/>
-                </a:solidFill>
-                <a:latin typeface="Tahoma" panose="020B0604030504040204"/>
-                <a:cs typeface="Tahoma" panose="020B0604030504040204"/>
-              </a:rPr>
-              <a:t>li</a:t>
-            </a:r>
-            <a:r>
-              <a:rPr sz="5400" spc="145" dirty="0">
-                <a:solidFill>
-                  <a:srgbClr val="404040"/>
-                </a:solidFill>
-                <a:latin typeface="Tahoma" panose="020B0604030504040204"/>
-                <a:cs typeface="Tahoma" panose="020B0604030504040204"/>
-              </a:rPr>
-              <a:t>c</a:t>
-            </a:r>
-            <a:r>
-              <a:rPr sz="5400" spc="-65" dirty="0">
-                <a:solidFill>
-                  <a:srgbClr val="404040"/>
-                </a:solidFill>
-                <a:latin typeface="Tahoma" panose="020B0604030504040204"/>
-                <a:cs typeface="Tahoma" panose="020B0604030504040204"/>
-              </a:rPr>
-              <a:t>a</a:t>
-            </a:r>
-            <a:r>
-              <a:rPr sz="5400" spc="130" dirty="0">
-                <a:solidFill>
-                  <a:srgbClr val="404040"/>
-                </a:solidFill>
-                <a:latin typeface="Tahoma" panose="020B0604030504040204"/>
-                <a:cs typeface="Tahoma" panose="020B0604030504040204"/>
-              </a:rPr>
-              <a:t>t</a:t>
-            </a:r>
-            <a:r>
-              <a:rPr sz="5400" spc="5" dirty="0">
-                <a:solidFill>
-                  <a:srgbClr val="404040"/>
-                </a:solidFill>
-                <a:latin typeface="Tahoma" panose="020B0604030504040204"/>
-                <a:cs typeface="Tahoma" panose="020B0604030504040204"/>
-              </a:rPr>
-              <a:t>i</a:t>
-            </a:r>
-            <a:r>
-              <a:rPr sz="5400" spc="35" dirty="0">
-                <a:solidFill>
-                  <a:srgbClr val="404040"/>
-                </a:solidFill>
-                <a:latin typeface="Tahoma" panose="020B0604030504040204"/>
-                <a:cs typeface="Tahoma" panose="020B0604030504040204"/>
-              </a:rPr>
-              <a:t>o</a:t>
-            </a:r>
-            <a:r>
-              <a:rPr sz="5400" spc="70" dirty="0">
-                <a:solidFill>
-                  <a:srgbClr val="404040"/>
-                </a:solidFill>
-                <a:latin typeface="Tahoma" panose="020B0604030504040204"/>
-                <a:cs typeface="Tahoma" panose="020B0604030504040204"/>
-              </a:rPr>
-              <a:t>ns</a:t>
-            </a:r>
-            <a:endParaRPr sz="5400">
-              <a:latin typeface="Tahoma" panose="020B0604030504040204"/>
-              <a:cs typeface="Tahoma" panose="020B0604030504040204"/>
-            </a:endParaRPr>
+              <a:rPr sz="6600" spc="15" dirty="0">
+                <a:solidFill>
+                  <a:srgbClr val="FFFFFF"/>
+                </a:solidFill>
+              </a:rPr>
+              <a:t>https://developers.google.com/ </a:t>
+            </a:r>
+            <a:r>
+              <a:rPr sz="6600" spc="-1739" dirty="0">
+                <a:solidFill>
+                  <a:srgbClr val="FFFFFF"/>
+                </a:solidFill>
+              </a:rPr>
+              <a:t> </a:t>
+            </a:r>
+            <a:r>
+              <a:rPr sz="6600" spc="50" dirty="0">
+                <a:solidFill>
+                  <a:srgbClr val="FFFFFF"/>
+                </a:solidFill>
+              </a:rPr>
+              <a:t>web/tools/workbox</a:t>
+            </a:r>
+            <a:endParaRPr sz="6600"/>
           </a:p>
         </p:txBody>
       </p:sp>
       <p:sp>
         <p:nvSpPr>
-          <p:cNvPr id="3" name="object 3"/>
-          <p:cNvSpPr txBox="1">
-            <a:spLocks noGrp="1"/>
-          </p:cNvSpPr>
-          <p:nvPr>
-            <p:ph type="ctrTitle"/>
-          </p:nvPr>
-        </p:nvSpPr>
-        <p:spPr>
-          <a:prstGeom prst="rect">
-            <a:avLst/>
-          </a:prstGeom>
-        </p:spPr>
-        <p:txBody>
-          <a:bodyPr vert="horz" wrap="square" lIns="0" tIns="12700" rIns="0" bIns="0" rtlCol="0">
-            <a:spAutoFit/>
-          </a:bodyPr>
-          <a:lstStyle/>
-          <a:p>
-            <a:pPr marL="5641340">
-              <a:lnSpc>
-                <a:spcPct val="100000"/>
-              </a:lnSpc>
-              <a:spcBef>
-                <a:spcPts val="100"/>
-              </a:spcBef>
-            </a:pPr>
-            <a:r>
-              <a:rPr spc="45" dirty="0"/>
-              <a:t>Great</a:t>
-            </a:r>
-            <a:r>
-              <a:rPr spc="-65" dirty="0"/>
-              <a:t> </a:t>
-            </a:r>
-            <a:r>
-              <a:rPr spc="-10" dirty="0"/>
-              <a:t>for</a:t>
-            </a:r>
-            <a:r>
-              <a:rPr spc="-55" dirty="0"/>
-              <a:t> </a:t>
-            </a:r>
-            <a:r>
-              <a:rPr spc="-45" dirty="0"/>
-              <a:t>occasionally</a:t>
-            </a:r>
-            <a:r>
-              <a:rPr spc="-50" dirty="0"/>
-              <a:t> </a:t>
-            </a:r>
-            <a:r>
-              <a:rPr spc="50" dirty="0"/>
-              <a:t>connected</a:t>
-            </a:r>
-            <a:r>
-              <a:rPr spc="-55" dirty="0"/>
-              <a:t> </a:t>
-            </a:r>
-            <a:r>
-              <a:rPr spc="-10" dirty="0"/>
-              <a:t>devices</a:t>
-            </a:r>
-            <a:endParaRPr spc="-10" dirty="0"/>
-          </a:p>
-          <a:p>
-            <a:pPr marL="5641340">
-              <a:lnSpc>
-                <a:spcPct val="100000"/>
-              </a:lnSpc>
-              <a:spcBef>
-                <a:spcPts val="2615"/>
-              </a:spcBef>
-            </a:pPr>
-            <a:r>
-              <a:rPr spc="-5" dirty="0"/>
-              <a:t>Potentially</a:t>
-            </a:r>
-            <a:r>
-              <a:rPr spc="-70" dirty="0"/>
-              <a:t> </a:t>
-            </a:r>
-            <a:r>
-              <a:rPr spc="20" dirty="0"/>
-              <a:t>extra</a:t>
-            </a:r>
-            <a:r>
-              <a:rPr spc="-75" dirty="0"/>
-              <a:t> </a:t>
-            </a:r>
-            <a:r>
-              <a:rPr spc="-50" dirty="0"/>
-              <a:t>work</a:t>
-            </a:r>
-            <a:endParaRPr spc="-50" dirty="0"/>
-          </a:p>
-        </p:txBody>
-      </p:sp>
-      <p:sp>
-        <p:nvSpPr>
-          <p:cNvPr id="4" name="object 4"/>
-          <p:cNvSpPr txBox="1"/>
-          <p:nvPr/>
-        </p:nvSpPr>
-        <p:spPr>
-          <a:xfrm>
-            <a:off x="7686040" y="5712459"/>
-            <a:ext cx="8585835" cy="543560"/>
-          </a:xfrm>
-          <a:prstGeom prst="rect">
-            <a:avLst/>
-          </a:prstGeom>
-        </p:spPr>
-        <p:txBody>
-          <a:bodyPr vert="horz" wrap="square" lIns="0" tIns="12700" rIns="0" bIns="0" rtlCol="0">
-            <a:spAutoFit/>
-          </a:bodyPr>
-          <a:lstStyle/>
-          <a:p>
-            <a:pPr marL="12700">
-              <a:lnSpc>
-                <a:spcPct val="100000"/>
-              </a:lnSpc>
-              <a:spcBef>
-                <a:spcPts val="100"/>
-              </a:spcBef>
-            </a:pPr>
-            <a:r>
-              <a:rPr sz="3400" b="1" spc="-45" dirty="0">
-                <a:solidFill>
-                  <a:srgbClr val="F15B2A"/>
-                </a:solidFill>
-                <a:latin typeface="Arial" panose="020B0604020202020204"/>
-                <a:cs typeface="Arial" panose="020B0604020202020204"/>
-              </a:rPr>
-              <a:t>Especially</a:t>
-            </a:r>
-            <a:r>
-              <a:rPr sz="3400" b="1" spc="-65" dirty="0">
-                <a:solidFill>
-                  <a:srgbClr val="F15B2A"/>
-                </a:solidFill>
-                <a:latin typeface="Arial" panose="020B0604020202020204"/>
-                <a:cs typeface="Arial" panose="020B0604020202020204"/>
-              </a:rPr>
-              <a:t> </a:t>
-            </a:r>
-            <a:r>
-              <a:rPr sz="3400" b="1" spc="25" dirty="0">
-                <a:solidFill>
-                  <a:srgbClr val="F15B2A"/>
-                </a:solidFill>
-                <a:latin typeface="Arial" panose="020B0604020202020204"/>
-                <a:cs typeface="Arial" panose="020B0604020202020204"/>
-              </a:rPr>
-              <a:t>when</a:t>
-            </a:r>
-            <a:r>
-              <a:rPr sz="3400" b="1" spc="-65" dirty="0">
-                <a:solidFill>
-                  <a:srgbClr val="F15B2A"/>
-                </a:solidFill>
-                <a:latin typeface="Arial" panose="020B0604020202020204"/>
-                <a:cs typeface="Arial" panose="020B0604020202020204"/>
-              </a:rPr>
-              <a:t> </a:t>
-            </a:r>
-            <a:r>
-              <a:rPr sz="3400" b="1" spc="-15" dirty="0">
-                <a:solidFill>
-                  <a:srgbClr val="F15B2A"/>
-                </a:solidFill>
-                <a:latin typeface="Arial" panose="020B0604020202020204"/>
-                <a:cs typeface="Arial" panose="020B0604020202020204"/>
-              </a:rPr>
-              <a:t>adding</a:t>
-            </a:r>
-            <a:r>
-              <a:rPr sz="3400" b="1" spc="-70" dirty="0">
-                <a:solidFill>
-                  <a:srgbClr val="F15B2A"/>
-                </a:solidFill>
-                <a:latin typeface="Arial" panose="020B0604020202020204"/>
-                <a:cs typeface="Arial" panose="020B0604020202020204"/>
-              </a:rPr>
-              <a:t> </a:t>
-            </a:r>
-            <a:r>
-              <a:rPr sz="3400" b="1" spc="-30" dirty="0">
-                <a:solidFill>
-                  <a:srgbClr val="F15B2A"/>
-                </a:solidFill>
-                <a:latin typeface="Arial" panose="020B0604020202020204"/>
-                <a:cs typeface="Arial" panose="020B0604020202020204"/>
-              </a:rPr>
-              <a:t>server</a:t>
-            </a:r>
-            <a:r>
-              <a:rPr sz="3400" b="1" spc="-65" dirty="0">
-                <a:solidFill>
-                  <a:srgbClr val="F15B2A"/>
-                </a:solidFill>
-                <a:latin typeface="Arial" panose="020B0604020202020204"/>
-                <a:cs typeface="Arial" panose="020B0604020202020204"/>
-              </a:rPr>
-              <a:t> </a:t>
-            </a:r>
-            <a:r>
-              <a:rPr sz="3400" b="1" spc="25" dirty="0">
-                <a:solidFill>
-                  <a:srgbClr val="F15B2A"/>
-                </a:solidFill>
-                <a:latin typeface="Arial" panose="020B0604020202020204"/>
-                <a:cs typeface="Arial" panose="020B0604020202020204"/>
-              </a:rPr>
-              <a:t>interaction</a:t>
-            </a:r>
-            <a:endParaRPr sz="3400">
-              <a:latin typeface="Arial" panose="020B0604020202020204"/>
-              <a:cs typeface="Arial" panose="020B0604020202020204"/>
-            </a:endParaRPr>
-          </a:p>
-        </p:txBody>
-      </p:sp>
-      <p:sp>
-        <p:nvSpPr>
-          <p:cNvPr id="5" name="Slide Number Placeholder 4"/>
+          <p:cNvPr id="3" name="Slide Number Placeholder 2"/>
           <p:cNvSpPr>
             <a:spLocks noGrp="1"/>
           </p:cNvSpPr>
@@ -4067,67 +3628,508 @@
       <p:sp>
         <p:nvSpPr>
           <p:cNvPr id="2" name="object 2"/>
-          <p:cNvSpPr txBox="1">
-            <a:spLocks noGrp="1"/>
-          </p:cNvSpPr>
-          <p:nvPr>
-            <p:ph type="title"/>
-          </p:nvPr>
+          <p:cNvSpPr txBox="1"/>
+          <p:nvPr/>
         </p:nvSpPr>
         <p:spPr>
           <a:xfrm>
-            <a:off x="3381692" y="4086859"/>
-            <a:ext cx="11524615" cy="2046605"/>
+            <a:off x="992699" y="4281932"/>
+            <a:ext cx="5145405" cy="1674495"/>
           </a:xfrm>
           <a:prstGeom prst="rect">
             <a:avLst/>
           </a:prstGeom>
         </p:spPr>
         <p:txBody>
-          <a:bodyPr vert="horz" wrap="square" lIns="0" tIns="3175" rIns="0" bIns="0" rtlCol="0">
+          <a:bodyPr vert="horz" wrap="square" lIns="0" tIns="9525" rIns="0" bIns="0" rtlCol="0">
             <a:spAutoFit/>
           </a:bodyPr>
           <a:lstStyle/>
           <a:p>
-            <a:pPr marL="2251075" marR="5080" indent="-2239010">
+            <a:pPr marL="1390650" marR="5080" indent="-1378585">
               <a:lnSpc>
-                <a:spcPct val="101000"/>
+                <a:spcPct val="100000"/>
               </a:lnSpc>
               <a:spcBef>
-                <a:spcPts val="25"/>
+                <a:spcPts val="75"/>
               </a:spcBef>
             </a:pPr>
             <a:r>
-              <a:rPr sz="6600" spc="15" dirty="0">
-                <a:solidFill>
-                  <a:srgbClr val="FFFFFF"/>
-                </a:solidFill>
-              </a:rPr>
-              <a:t>https://developers.google.com/ </a:t>
-            </a:r>
-            <a:r>
-              <a:rPr sz="6600" spc="-1739" dirty="0">
-                <a:solidFill>
-                  <a:srgbClr val="FFFFFF"/>
-                </a:solidFill>
-              </a:rPr>
-              <a:t> </a:t>
-            </a:r>
-            <a:r>
-              <a:rPr sz="6600" spc="50" dirty="0">
-                <a:solidFill>
-                  <a:srgbClr val="FFFFFF"/>
-                </a:solidFill>
-              </a:rPr>
-              <a:t>web/tools/workbox</a:t>
-            </a:r>
-            <a:endParaRPr sz="6600"/>
+              <a:rPr sz="5400" spc="265" dirty="0">
+                <a:solidFill>
+                  <a:srgbClr val="404040"/>
+                </a:solidFill>
+                <a:latin typeface="Tahoma" panose="020B0604030504040204"/>
+                <a:cs typeface="Tahoma" panose="020B0604030504040204"/>
+              </a:rPr>
+              <a:t>P</a:t>
+            </a:r>
+            <a:r>
+              <a:rPr sz="5400" spc="-75" dirty="0">
+                <a:solidFill>
+                  <a:srgbClr val="404040"/>
+                </a:solidFill>
+                <a:latin typeface="Tahoma" panose="020B0604030504040204"/>
+                <a:cs typeface="Tahoma" panose="020B0604030504040204"/>
+              </a:rPr>
+              <a:t>r</a:t>
+            </a:r>
+            <a:r>
+              <a:rPr sz="5400" spc="125" dirty="0">
+                <a:solidFill>
+                  <a:srgbClr val="404040"/>
+                </a:solidFill>
+                <a:latin typeface="Tahoma" panose="020B0604030504040204"/>
+                <a:cs typeface="Tahoma" panose="020B0604030504040204"/>
+              </a:rPr>
+              <a:t>o</a:t>
+            </a:r>
+            <a:r>
+              <a:rPr sz="5400" spc="160" dirty="0">
+                <a:solidFill>
+                  <a:srgbClr val="404040"/>
+                </a:solidFill>
+                <a:latin typeface="Tahoma" panose="020B0604030504040204"/>
+                <a:cs typeface="Tahoma" panose="020B0604030504040204"/>
+              </a:rPr>
+              <a:t>g</a:t>
+            </a:r>
+            <a:r>
+              <a:rPr sz="5400" spc="-75" dirty="0">
+                <a:solidFill>
+                  <a:srgbClr val="404040"/>
+                </a:solidFill>
+                <a:latin typeface="Tahoma" panose="020B0604030504040204"/>
+                <a:cs typeface="Tahoma" panose="020B0604030504040204"/>
+              </a:rPr>
+              <a:t>r</a:t>
+            </a:r>
+            <a:r>
+              <a:rPr sz="5400" spc="180" dirty="0">
+                <a:solidFill>
+                  <a:srgbClr val="404040"/>
+                </a:solidFill>
+                <a:latin typeface="Tahoma" panose="020B0604030504040204"/>
+                <a:cs typeface="Tahoma" panose="020B0604030504040204"/>
+              </a:rPr>
+              <a:t>e</a:t>
+            </a:r>
+            <a:r>
+              <a:rPr sz="5400" spc="10" dirty="0">
+                <a:solidFill>
+                  <a:srgbClr val="404040"/>
+                </a:solidFill>
+                <a:latin typeface="Tahoma" panose="020B0604030504040204"/>
+                <a:cs typeface="Tahoma" panose="020B0604030504040204"/>
+              </a:rPr>
+              <a:t>ss</a:t>
+            </a:r>
+            <a:r>
+              <a:rPr sz="5400" spc="-5" dirty="0">
+                <a:solidFill>
+                  <a:srgbClr val="404040"/>
+                </a:solidFill>
+                <a:latin typeface="Tahoma" panose="020B0604030504040204"/>
+                <a:cs typeface="Tahoma" panose="020B0604030504040204"/>
+              </a:rPr>
+              <a:t>i</a:t>
+            </a:r>
+            <a:r>
+              <a:rPr sz="5400" spc="-10" dirty="0">
+                <a:solidFill>
+                  <a:srgbClr val="404040"/>
+                </a:solidFill>
+                <a:latin typeface="Tahoma" panose="020B0604030504040204"/>
+                <a:cs typeface="Tahoma" panose="020B0604030504040204"/>
+              </a:rPr>
+              <a:t>v</a:t>
+            </a:r>
+            <a:r>
+              <a:rPr sz="5400" spc="180" dirty="0">
+                <a:solidFill>
+                  <a:srgbClr val="404040"/>
+                </a:solidFill>
+                <a:latin typeface="Tahoma" panose="020B0604030504040204"/>
+                <a:cs typeface="Tahoma" panose="020B0604030504040204"/>
+              </a:rPr>
+              <a:t>e</a:t>
+            </a:r>
+            <a:r>
+              <a:rPr sz="5400" spc="-375" dirty="0">
+                <a:solidFill>
+                  <a:srgbClr val="404040"/>
+                </a:solidFill>
+                <a:latin typeface="Tahoma" panose="020B0604030504040204"/>
+                <a:cs typeface="Tahoma" panose="020B0604030504040204"/>
+              </a:rPr>
+              <a:t> </a:t>
+            </a:r>
+            <a:r>
+              <a:rPr sz="5400" spc="-140" dirty="0">
+                <a:solidFill>
+                  <a:srgbClr val="404040"/>
+                </a:solidFill>
+                <a:latin typeface="Tahoma" panose="020B0604030504040204"/>
+                <a:cs typeface="Tahoma" panose="020B0604030504040204"/>
+              </a:rPr>
+              <a:t>W</a:t>
+            </a:r>
+            <a:r>
+              <a:rPr sz="5400" spc="180" dirty="0">
+                <a:solidFill>
+                  <a:srgbClr val="404040"/>
+                </a:solidFill>
+                <a:latin typeface="Tahoma" panose="020B0604030504040204"/>
+                <a:cs typeface="Tahoma" panose="020B0604030504040204"/>
+              </a:rPr>
+              <a:t>e</a:t>
+            </a:r>
+            <a:r>
+              <a:rPr sz="5400" spc="160" dirty="0">
+                <a:solidFill>
+                  <a:srgbClr val="404040"/>
+                </a:solidFill>
+                <a:latin typeface="Tahoma" panose="020B0604030504040204"/>
+                <a:cs typeface="Tahoma" panose="020B0604030504040204"/>
+              </a:rPr>
+              <a:t>b  </a:t>
+            </a:r>
+            <a:r>
+              <a:rPr sz="5400" spc="145" dirty="0">
+                <a:solidFill>
+                  <a:srgbClr val="404040"/>
+                </a:solidFill>
+                <a:latin typeface="Tahoma" panose="020B0604030504040204"/>
+                <a:cs typeface="Tahoma" panose="020B0604030504040204"/>
+              </a:rPr>
+              <a:t>A</a:t>
+            </a:r>
+            <a:r>
+              <a:rPr sz="5400" spc="140" dirty="0">
+                <a:solidFill>
+                  <a:srgbClr val="404040"/>
+                </a:solidFill>
+                <a:latin typeface="Tahoma" panose="020B0604030504040204"/>
+                <a:cs typeface="Tahoma" panose="020B0604030504040204"/>
+              </a:rPr>
+              <a:t>p</a:t>
+            </a:r>
+            <a:r>
+              <a:rPr sz="5400" spc="225" dirty="0">
+                <a:solidFill>
+                  <a:srgbClr val="404040"/>
+                </a:solidFill>
+                <a:latin typeface="Tahoma" panose="020B0604030504040204"/>
+                <a:cs typeface="Tahoma" panose="020B0604030504040204"/>
+              </a:rPr>
+              <a:t>p</a:t>
+            </a:r>
+            <a:r>
+              <a:rPr sz="5400" spc="65" dirty="0">
+                <a:solidFill>
+                  <a:srgbClr val="404040"/>
+                </a:solidFill>
+                <a:latin typeface="Tahoma" panose="020B0604030504040204"/>
+                <a:cs typeface="Tahoma" panose="020B0604030504040204"/>
+              </a:rPr>
+              <a:t>li</a:t>
+            </a:r>
+            <a:r>
+              <a:rPr sz="5400" spc="145" dirty="0">
+                <a:solidFill>
+                  <a:srgbClr val="404040"/>
+                </a:solidFill>
+                <a:latin typeface="Tahoma" panose="020B0604030504040204"/>
+                <a:cs typeface="Tahoma" panose="020B0604030504040204"/>
+              </a:rPr>
+              <a:t>c</a:t>
+            </a:r>
+            <a:r>
+              <a:rPr sz="5400" spc="-65" dirty="0">
+                <a:solidFill>
+                  <a:srgbClr val="404040"/>
+                </a:solidFill>
+                <a:latin typeface="Tahoma" panose="020B0604030504040204"/>
+                <a:cs typeface="Tahoma" panose="020B0604030504040204"/>
+              </a:rPr>
+              <a:t>a</a:t>
+            </a:r>
+            <a:r>
+              <a:rPr sz="5400" spc="130" dirty="0">
+                <a:solidFill>
+                  <a:srgbClr val="404040"/>
+                </a:solidFill>
+                <a:latin typeface="Tahoma" panose="020B0604030504040204"/>
+                <a:cs typeface="Tahoma" panose="020B0604030504040204"/>
+              </a:rPr>
+              <a:t>t</a:t>
+            </a:r>
+            <a:r>
+              <a:rPr sz="5400" spc="5" dirty="0">
+                <a:solidFill>
+                  <a:srgbClr val="404040"/>
+                </a:solidFill>
+                <a:latin typeface="Tahoma" panose="020B0604030504040204"/>
+                <a:cs typeface="Tahoma" panose="020B0604030504040204"/>
+              </a:rPr>
+              <a:t>i</a:t>
+            </a:r>
+            <a:r>
+              <a:rPr sz="5400" spc="35" dirty="0">
+                <a:solidFill>
+                  <a:srgbClr val="404040"/>
+                </a:solidFill>
+                <a:latin typeface="Tahoma" panose="020B0604030504040204"/>
+                <a:cs typeface="Tahoma" panose="020B0604030504040204"/>
+              </a:rPr>
+              <a:t>o</a:t>
+            </a:r>
+            <a:r>
+              <a:rPr sz="5400" spc="70" dirty="0">
+                <a:solidFill>
+                  <a:srgbClr val="404040"/>
+                </a:solidFill>
+                <a:latin typeface="Tahoma" panose="020B0604030504040204"/>
+                <a:cs typeface="Tahoma" panose="020B0604030504040204"/>
+              </a:rPr>
+              <a:t>ns</a:t>
+            </a:r>
+            <a:endParaRPr sz="5400">
+              <a:latin typeface="Tahoma" panose="020B0604030504040204"/>
+              <a:cs typeface="Tahoma" panose="020B0604030504040204"/>
+            </a:endParaRPr>
           </a:p>
         </p:txBody>
       </p:sp>
       <p:sp>
         <p:nvSpPr>
-          <p:cNvPr id="3" name="Slide Number Placeholder 2"/>
+          <p:cNvPr id="3" name="object 3"/>
+          <p:cNvSpPr txBox="1">
+            <a:spLocks noGrp="1"/>
+          </p:cNvSpPr>
+          <p:nvPr>
+            <p:ph type="ctrTitle"/>
+          </p:nvPr>
+        </p:nvSpPr>
+        <p:spPr>
+          <a:prstGeom prst="rect">
+            <a:avLst/>
+          </a:prstGeom>
+        </p:spPr>
+        <p:txBody>
+          <a:bodyPr vert="horz" wrap="square" lIns="0" tIns="12700" rIns="0" bIns="0" rtlCol="0">
+            <a:spAutoFit/>
+          </a:bodyPr>
+          <a:lstStyle/>
+          <a:p>
+            <a:pPr marL="5641340">
+              <a:lnSpc>
+                <a:spcPct val="100000"/>
+              </a:lnSpc>
+              <a:spcBef>
+                <a:spcPts val="100"/>
+              </a:spcBef>
+            </a:pPr>
+            <a:r>
+              <a:rPr spc="45" dirty="0"/>
+              <a:t>Great</a:t>
+            </a:r>
+            <a:r>
+              <a:rPr spc="-65" dirty="0"/>
+              <a:t> </a:t>
+            </a:r>
+            <a:r>
+              <a:rPr spc="-10" dirty="0"/>
+              <a:t>for</a:t>
+            </a:r>
+            <a:r>
+              <a:rPr spc="-55" dirty="0"/>
+              <a:t> </a:t>
+            </a:r>
+            <a:r>
+              <a:rPr spc="-45" dirty="0"/>
+              <a:t>occasionally</a:t>
+            </a:r>
+            <a:r>
+              <a:rPr spc="-50" dirty="0"/>
+              <a:t> </a:t>
+            </a:r>
+            <a:r>
+              <a:rPr spc="50" dirty="0"/>
+              <a:t>connected</a:t>
+            </a:r>
+            <a:r>
+              <a:rPr spc="-55" dirty="0"/>
+              <a:t> </a:t>
+            </a:r>
+            <a:r>
+              <a:rPr spc="-10" dirty="0"/>
+              <a:t>devices</a:t>
+            </a:r>
+            <a:endParaRPr spc="-10" dirty="0"/>
+          </a:p>
+          <a:p>
+            <a:pPr marL="5641340">
+              <a:lnSpc>
+                <a:spcPct val="100000"/>
+              </a:lnSpc>
+              <a:spcBef>
+                <a:spcPts val="2615"/>
+              </a:spcBef>
+            </a:pPr>
+            <a:r>
+              <a:rPr spc="-5" dirty="0"/>
+              <a:t>Potentially</a:t>
+            </a:r>
+            <a:r>
+              <a:rPr spc="-70" dirty="0"/>
+              <a:t> </a:t>
+            </a:r>
+            <a:r>
+              <a:rPr spc="20" dirty="0"/>
+              <a:t>extra</a:t>
+            </a:r>
+            <a:r>
+              <a:rPr spc="-75" dirty="0"/>
+              <a:t> </a:t>
+            </a:r>
+            <a:r>
+              <a:rPr spc="-50" dirty="0"/>
+              <a:t>work</a:t>
+            </a:r>
+            <a:endParaRPr spc="-50" dirty="0"/>
+          </a:p>
+        </p:txBody>
+      </p:sp>
+      <p:sp>
+        <p:nvSpPr>
+          <p:cNvPr id="4" name="object 4"/>
+          <p:cNvSpPr txBox="1"/>
+          <p:nvPr/>
+        </p:nvSpPr>
+        <p:spPr>
+          <a:xfrm>
+            <a:off x="7686040" y="5712459"/>
+            <a:ext cx="8585835" cy="543560"/>
+          </a:xfrm>
+          <a:prstGeom prst="rect">
+            <a:avLst/>
+          </a:prstGeom>
+        </p:spPr>
+        <p:txBody>
+          <a:bodyPr vert="horz" wrap="square" lIns="0" tIns="12700" rIns="0" bIns="0" rtlCol="0">
+            <a:spAutoFit/>
+          </a:bodyPr>
+          <a:lstStyle/>
+          <a:p>
+            <a:pPr marL="12700">
+              <a:lnSpc>
+                <a:spcPct val="100000"/>
+              </a:lnSpc>
+              <a:spcBef>
+                <a:spcPts val="100"/>
+              </a:spcBef>
+            </a:pPr>
+            <a:r>
+              <a:rPr sz="3400" b="1" spc="-45" dirty="0">
+                <a:solidFill>
+                  <a:srgbClr val="F15B2A"/>
+                </a:solidFill>
+                <a:latin typeface="Arial" panose="020B0604020202020204"/>
+                <a:cs typeface="Arial" panose="020B0604020202020204"/>
+              </a:rPr>
+              <a:t>Especially</a:t>
+            </a:r>
+            <a:r>
+              <a:rPr sz="3400" b="1" spc="-65" dirty="0">
+                <a:solidFill>
+                  <a:srgbClr val="F15B2A"/>
+                </a:solidFill>
+                <a:latin typeface="Arial" panose="020B0604020202020204"/>
+                <a:cs typeface="Arial" panose="020B0604020202020204"/>
+              </a:rPr>
+              <a:t> </a:t>
+            </a:r>
+            <a:r>
+              <a:rPr sz="3400" b="1" spc="25" dirty="0">
+                <a:solidFill>
+                  <a:srgbClr val="F15B2A"/>
+                </a:solidFill>
+                <a:latin typeface="Arial" panose="020B0604020202020204"/>
+                <a:cs typeface="Arial" panose="020B0604020202020204"/>
+              </a:rPr>
+              <a:t>when</a:t>
+            </a:r>
+            <a:r>
+              <a:rPr sz="3400" b="1" spc="-65" dirty="0">
+                <a:solidFill>
+                  <a:srgbClr val="F15B2A"/>
+                </a:solidFill>
+                <a:latin typeface="Arial" panose="020B0604020202020204"/>
+                <a:cs typeface="Arial" panose="020B0604020202020204"/>
+              </a:rPr>
+              <a:t> </a:t>
+            </a:r>
+            <a:r>
+              <a:rPr sz="3400" b="1" spc="-15" dirty="0">
+                <a:solidFill>
+                  <a:srgbClr val="F15B2A"/>
+                </a:solidFill>
+                <a:latin typeface="Arial" panose="020B0604020202020204"/>
+                <a:cs typeface="Arial" panose="020B0604020202020204"/>
+              </a:rPr>
+              <a:t>adding</a:t>
+            </a:r>
+            <a:r>
+              <a:rPr sz="3400" b="1" spc="-70" dirty="0">
+                <a:solidFill>
+                  <a:srgbClr val="F15B2A"/>
+                </a:solidFill>
+                <a:latin typeface="Arial" panose="020B0604020202020204"/>
+                <a:cs typeface="Arial" panose="020B0604020202020204"/>
+              </a:rPr>
+              <a:t> </a:t>
+            </a:r>
+            <a:r>
+              <a:rPr sz="3400" b="1" spc="-30" dirty="0">
+                <a:solidFill>
+                  <a:srgbClr val="F15B2A"/>
+                </a:solidFill>
+                <a:latin typeface="Arial" panose="020B0604020202020204"/>
+                <a:cs typeface="Arial" panose="020B0604020202020204"/>
+              </a:rPr>
+              <a:t>server</a:t>
+            </a:r>
+            <a:r>
+              <a:rPr sz="3400" b="1" spc="-65" dirty="0">
+                <a:solidFill>
+                  <a:srgbClr val="F15B2A"/>
+                </a:solidFill>
+                <a:latin typeface="Arial" panose="020B0604020202020204"/>
+                <a:cs typeface="Arial" panose="020B0604020202020204"/>
+              </a:rPr>
+              <a:t> </a:t>
+            </a:r>
+            <a:r>
+              <a:rPr sz="3400" b="1" spc="25" dirty="0">
+                <a:solidFill>
+                  <a:srgbClr val="F15B2A"/>
+                </a:solidFill>
+                <a:latin typeface="Arial" panose="020B0604020202020204"/>
+                <a:cs typeface="Arial" panose="020B0604020202020204"/>
+              </a:rPr>
+              <a:t>interaction</a:t>
+            </a:r>
+            <a:endParaRPr sz="3400">
+              <a:latin typeface="Arial" panose="020B0604020202020204"/>
+              <a:cs typeface="Arial" panose="020B0604020202020204"/>
+            </a:endParaRPr>
+          </a:p>
+        </p:txBody>
+      </p:sp>
+      <p:sp>
+        <p:nvSpPr>
+          <p:cNvPr id="5" name="Slide Number Placeholder 4"/>
           <p:cNvSpPr>
             <a:spLocks noGrp="1"/>
           </p:cNvSpPr>
@@ -4155,6 +4157,311 @@
 </file>
 
 <file path=ppt/slides/slide15.xml><?xml version="1.0" encoding="utf-8"?>
+<p:sld xmlns:a="http://schemas.openxmlformats.org/drawingml/2006/main" xmlns:r="http://schemas.openxmlformats.org/officeDocument/2006/relationships" xmlns:p="http://schemas.openxmlformats.org/presentationml/2006/main">
+  <p:cSld>
+    <p:spTree>
+      <p:nvGrpSpPr>
+        <p:cNvPr id="1" name=""/>
+        <p:cNvGrpSpPr/>
+        <p:nvPr/>
+      </p:nvGrpSpPr>
+      <p:grpSpPr>
+        <a:xfrm>
+          <a:off x="0" y="0"/>
+          <a:ext cx="0" cy="0"/>
+          <a:chOff x="0" y="0"/>
+          <a:chExt cx="0" cy="0"/>
+        </a:xfrm>
+      </p:grpSpPr>
+      <p:sp>
+        <p:nvSpPr>
+          <p:cNvPr id="2" name="object 2"/>
+          <p:cNvSpPr txBox="1"/>
+          <p:nvPr/>
+        </p:nvSpPr>
+        <p:spPr>
+          <a:xfrm>
+            <a:off x="992699" y="4281932"/>
+            <a:ext cx="5145405" cy="1671320"/>
+          </a:xfrm>
+          <a:prstGeom prst="rect">
+            <a:avLst/>
+          </a:prstGeom>
+        </p:spPr>
+        <p:txBody>
+          <a:bodyPr vert="horz" wrap="square" lIns="0" tIns="9525" rIns="0" bIns="0" rtlCol="0">
+            <a:spAutoFit/>
+          </a:bodyPr>
+          <a:lstStyle/>
+          <a:p>
+            <a:pPr marL="1390650" marR="5080" indent="-1378585">
+              <a:lnSpc>
+                <a:spcPct val="100000"/>
+              </a:lnSpc>
+              <a:spcBef>
+                <a:spcPts val="75"/>
+              </a:spcBef>
+            </a:pPr>
+            <a:r>
+              <a:rPr sz="5400" dirty="0">
+                <a:solidFill>
+                  <a:srgbClr val="404040"/>
+                </a:solidFill>
+                <a:latin typeface="Tahoma" panose="020B0604030504040204"/>
+                <a:cs typeface="Tahoma" panose="020B0604030504040204"/>
+              </a:rPr>
+              <a:t>Styling React Using CSS</a:t>
+            </a:r>
+            <a:endParaRPr sz="5400" dirty="0">
+              <a:solidFill>
+                <a:srgbClr val="404040"/>
+              </a:solidFill>
+              <a:latin typeface="Tahoma" panose="020B0604030504040204"/>
+              <a:cs typeface="Tahoma" panose="020B0604030504040204"/>
+            </a:endParaRPr>
+          </a:p>
+        </p:txBody>
+      </p:sp>
+      <p:sp>
+        <p:nvSpPr>
+          <p:cNvPr id="3" name="object 3"/>
+          <p:cNvSpPr txBox="1">
+            <a:spLocks noGrp="1"/>
+          </p:cNvSpPr>
+          <p:nvPr>
+            <p:ph type="ctrTitle"/>
+          </p:nvPr>
+        </p:nvSpPr>
+        <p:spPr>
+          <a:xfrm>
+            <a:off x="2057399" y="4000754"/>
+            <a:ext cx="14173200" cy="2105025"/>
+          </a:xfrm>
+          <a:prstGeom prst="rect">
+            <a:avLst/>
+          </a:prstGeom>
+        </p:spPr>
+        <p:txBody>
+          <a:bodyPr vert="horz" wrap="square" lIns="0" tIns="12700" rIns="0" bIns="0" rtlCol="0">
+            <a:spAutoFit/>
+          </a:bodyPr>
+          <a:lstStyle/>
+          <a:p>
+            <a:pPr marL="5641340">
+              <a:lnSpc>
+                <a:spcPct val="100000"/>
+              </a:lnSpc>
+              <a:spcBef>
+                <a:spcPts val="100"/>
+              </a:spcBef>
+            </a:pPr>
+            <a:r>
+              <a:rPr lang="en-US" dirty="0"/>
+              <a:t> </a:t>
+            </a:r>
+            <a:r>
+              <a:rPr dirty="0"/>
+              <a:t>Inline Styling</a:t>
+            </a:r>
+            <a:br>
+              <a:rPr dirty="0"/>
+            </a:br>
+            <a:br>
+              <a:rPr dirty="0"/>
+            </a:br>
+            <a:r>
+              <a:rPr dirty="0"/>
+              <a:t>JavaScript Object</a:t>
+            </a:r>
+            <a:br>
+              <a:rPr dirty="0"/>
+            </a:br>
+            <a:endParaRPr spc="-50" dirty="0"/>
+          </a:p>
+        </p:txBody>
+      </p:sp>
+      <p:sp>
+        <p:nvSpPr>
+          <p:cNvPr id="4" name="object 4"/>
+          <p:cNvSpPr txBox="1"/>
+          <p:nvPr/>
+        </p:nvSpPr>
+        <p:spPr>
+          <a:xfrm>
+            <a:off x="7609840" y="6169659"/>
+            <a:ext cx="8585835" cy="535305"/>
+          </a:xfrm>
+          <a:prstGeom prst="rect">
+            <a:avLst/>
+          </a:prstGeom>
+        </p:spPr>
+        <p:txBody>
+          <a:bodyPr vert="horz" wrap="square" lIns="0" tIns="12700" rIns="0" bIns="0" rtlCol="0">
+            <a:spAutoFit/>
+          </a:bodyPr>
+          <a:lstStyle/>
+          <a:p>
+            <a:pPr marL="12700">
+              <a:lnSpc>
+                <a:spcPct val="100000"/>
+              </a:lnSpc>
+              <a:spcBef>
+                <a:spcPts val="100"/>
+              </a:spcBef>
+            </a:pPr>
+            <a:r>
+              <a:rPr sz="3400" b="1" dirty="0">
+                <a:solidFill>
+                  <a:srgbClr val="F15B2A"/>
+                </a:solidFill>
+                <a:latin typeface="Arial" panose="020B0604020202020204"/>
+                <a:cs typeface="Arial" panose="020B0604020202020204"/>
+              </a:rPr>
+              <a:t> CSS Stylesheet</a:t>
+            </a:r>
+            <a:endParaRPr sz="3400" b="1" dirty="0">
+              <a:solidFill>
+                <a:srgbClr val="F15B2A"/>
+              </a:solidFill>
+              <a:latin typeface="Arial" panose="020B0604020202020204"/>
+              <a:cs typeface="Arial" panose="020B0604020202020204"/>
+            </a:endParaRPr>
+          </a:p>
+        </p:txBody>
+      </p:sp>
+      <p:sp>
+        <p:nvSpPr>
+          <p:cNvPr id="5" name="Slide Number Placeholder 4"/>
+          <p:cNvSpPr>
+            <a:spLocks noGrp="1"/>
+          </p:cNvSpPr>
+          <p:nvPr>
+            <p:ph type="sldNum" sz="quarter" idx="7"/>
+          </p:nvPr>
+        </p:nvSpPr>
+        <p:spPr/>
+        <p:txBody>
+          <a:bodyPr/>
+          <a:p>
+            <a:fld id="{B6F15528-21DE-4FAA-801E-634DDDAF4B2B}" type="slidenum">
+              <a:rPr/>
+            </a:fld>
+            <a:endParaRPr/>
+          </a:p>
+        </p:txBody>
+      </p:sp>
+    </p:spTree>
+  </p:cSld>
+  <p:clrMapOvr>
+    <a:masterClrMapping/>
+  </p:clrMapOvr>
+</p:sld>
+</file>
+
+<file path=ppt/slides/slide16.xml><?xml version="1.0" encoding="utf-8"?>
+<p:sld xmlns:a="http://schemas.openxmlformats.org/drawingml/2006/main" xmlns:r="http://schemas.openxmlformats.org/officeDocument/2006/relationships" xmlns:p="http://schemas.openxmlformats.org/presentationml/2006/main">
+  <p:cSld>
+    <p:spTree>
+      <p:nvGrpSpPr>
+        <p:cNvPr id="1" name=""/>
+        <p:cNvGrpSpPr/>
+        <p:nvPr/>
+      </p:nvGrpSpPr>
+      <p:grpSpPr/>
+      <p:sp>
+        <p:nvSpPr>
+          <p:cNvPr id="5" name="Title 4"/>
+          <p:cNvSpPr>
+            <a:spLocks noGrp="1"/>
+          </p:cNvSpPr>
+          <p:nvPr>
+            <p:ph type="title"/>
+          </p:nvPr>
+        </p:nvSpPr>
+        <p:spPr/>
+        <p:txBody>
+          <a:bodyPr/>
+          <a:p>
+            <a:endParaRPr lang="en-US"/>
+          </a:p>
+        </p:txBody>
+      </p:sp>
+      <p:sp>
+        <p:nvSpPr>
+          <p:cNvPr id="4" name="Slide Number Placeholder 3"/>
+          <p:cNvSpPr>
+            <a:spLocks noGrp="1"/>
+          </p:cNvSpPr>
+          <p:nvPr>
+            <p:ph type="sldNum" sz="quarter" idx="7"/>
+          </p:nvPr>
+        </p:nvSpPr>
+        <p:spPr/>
+        <p:txBody>
+          <a:bodyPr/>
+          <a:p>
+            <a:fld id="{B6F15528-21DE-4FAA-801E-634DDDAF4B2B}" type="slidenum">
+              <a:rPr/>
+            </a:fld>
+            <a:endParaRPr/>
+          </a:p>
+        </p:txBody>
+      </p:sp>
+      <p:sp>
+        <p:nvSpPr>
+          <p:cNvPr id="6" name="Content Placeholder 5"/>
+          <p:cNvSpPr>
+            <a:spLocks noGrp="1"/>
+          </p:cNvSpPr>
+          <p:nvPr>
+            <p:ph sz="half" idx="3"/>
+          </p:nvPr>
+        </p:nvSpPr>
+        <p:spPr/>
+        <p:txBody>
+          <a:bodyPr/>
+          <a:p>
+            <a:endParaRPr lang="en-US"/>
+          </a:p>
+        </p:txBody>
+      </p:sp>
+      <p:pic>
+        <p:nvPicPr>
+          <p:cNvPr id="100" name="Content Placeholder 99"/>
+          <p:cNvPicPr/>
+          <p:nvPr>
+            <p:ph sz="half" idx="2"/>
+          </p:nvPr>
+        </p:nvPicPr>
+        <p:blipFill>
+          <a:blip r:embed="rId1"/>
+          <a:stretch>
+            <a:fillRect/>
+          </a:stretch>
+        </p:blipFill>
+        <p:spPr>
+          <a:xfrm>
+            <a:off x="3124200" y="636270"/>
+            <a:ext cx="11957050" cy="9014460"/>
+          </a:xfrm>
+          <a:prstGeom prst="rect">
+            <a:avLst/>
+          </a:prstGeom>
+          <a:noFill/>
+          <a:ln w="9525">
+            <a:noFill/>
+          </a:ln>
+        </p:spPr>
+      </p:pic>
+    </p:spTree>
+  </p:cSld>
+  <p:clrMapOvr>
+    <a:masterClrMapping/>
+  </p:clrMapOvr>
+</p:sld>
+</file>
+
+<file path=ppt/slides/slide17.xml><?xml version="1.0" encoding="utf-8"?>
 <p:sld xmlns:a="http://schemas.openxmlformats.org/drawingml/2006/main" xmlns:r="http://schemas.openxmlformats.org/officeDocument/2006/relationships" xmlns:p="http://schemas.openxmlformats.org/presentationml/2006/main">
   <p:cSld>
     <p:spTree>
@@ -4425,8 +4732,8 @@
         </p:nvSpPr>
         <p:spPr>
           <a:xfrm>
-            <a:off x="7944801" y="5568188"/>
-            <a:ext cx="2579370" cy="2363470"/>
+            <a:off x="7924800" y="5600700"/>
+            <a:ext cx="7376795" cy="4190365"/>
           </a:xfrm>
           <a:prstGeom prst="rect">
             <a:avLst/>
@@ -4510,6 +4817,23 @@
               </a:rPr>
               <a:t> </a:t>
             </a:r>
+            <a:endParaRPr sz="3600" b="1" spc="-985" dirty="0">
+              <a:solidFill>
+                <a:srgbClr val="F15B2A"/>
+              </a:solidFill>
+              <a:latin typeface="Arial" panose="020B0604020202020204"/>
+              <a:cs typeface="Arial" panose="020B0604020202020204"/>
+            </a:endParaRPr>
+          </a:p>
+          <a:p>
+            <a:pPr marL="12700" marR="5080">
+              <a:lnSpc>
+                <a:spcPct val="162000"/>
+              </a:lnSpc>
+              <a:spcBef>
+                <a:spcPts val="70"/>
+              </a:spcBef>
+            </a:pPr>
             <a:r>
               <a:rPr sz="3600" b="1" spc="-165" dirty="0">
                 <a:solidFill>
@@ -4520,7 +4844,70 @@
               </a:rPr>
               <a:t>PWA</a:t>
             </a:r>
-            <a:endParaRPr sz="3600">
+            <a:endParaRPr sz="3600" b="1" spc="-165" dirty="0">
+              <a:solidFill>
+                <a:srgbClr val="F15B2A"/>
+              </a:solidFill>
+              <a:latin typeface="Arial" panose="020B0604020202020204"/>
+              <a:cs typeface="Arial" panose="020B0604020202020204"/>
+            </a:endParaRPr>
+          </a:p>
+          <a:p>
+            <a:pPr marL="12700" marR="5080" algn="l">
+              <a:lnSpc>
+                <a:spcPct val="162000"/>
+              </a:lnSpc>
+              <a:spcBef>
+                <a:spcPts val="70"/>
+              </a:spcBef>
+              <a:buClrTx/>
+              <a:buSzTx/>
+              <a:buFontTx/>
+            </a:pPr>
+            <a:r>
+              <a:rPr sz="3600" b="1" spc="30" dirty="0">
+                <a:solidFill>
+                  <a:srgbClr val="F15B2A"/>
+                </a:solidFill>
+                <a:latin typeface="Arial" panose="020B0604020202020204"/>
+                <a:cs typeface="Arial" panose="020B0604020202020204"/>
+              </a:rPr>
+              <a:t>Styling React Using CSS</a:t>
+            </a:r>
+            <a:endParaRPr sz="3600" b="1" spc="30" dirty="0">
+              <a:solidFill>
+                <a:srgbClr val="F15B2A"/>
+              </a:solidFill>
+              <a:latin typeface="Arial" panose="020B0604020202020204"/>
+              <a:cs typeface="Arial" panose="020B0604020202020204"/>
+            </a:endParaRPr>
+          </a:p>
+          <a:p>
+            <a:pPr marL="12700" marR="5080" algn="l">
+              <a:lnSpc>
+                <a:spcPct val="162000"/>
+              </a:lnSpc>
+              <a:spcBef>
+                <a:spcPts val="70"/>
+              </a:spcBef>
+              <a:buClrTx/>
+              <a:buSzTx/>
+              <a:buFontTx/>
+            </a:pPr>
+            <a:r>
+              <a:rPr sz="3600" b="1" spc="30" dirty="0">
+                <a:solidFill>
+                  <a:srgbClr val="F15B2A"/>
+                </a:solidFill>
+                <a:latin typeface="Arial" panose="020B0604020202020204"/>
+                <a:cs typeface="Arial" panose="020B0604020202020204"/>
+              </a:rPr>
+              <a:t>Higher Order Components</a:t>
+            </a:r>
+            <a:endParaRPr sz="3600" b="1" spc="30" dirty="0">
+              <a:solidFill>
+                <a:srgbClr val="F15B2A"/>
+              </a:solidFill>
               <a:latin typeface="Arial" panose="020B0604020202020204"/>
               <a:cs typeface="Arial" panose="020B0604020202020204"/>
             </a:endParaRPr>

</xml_diff>